<commit_message>
not very great but so are the llms
</commit_message>
<xml_diff>
--- a/Blind_Teaser_Centum_Final.pptx
+++ b/Blind_Teaser_Centum_Final.pptx
@@ -109,148 +109,6 @@
     </a:lvl9pPr>
   </p:defaultTextStyle>
 </p:presentation>
-</file>
-
-<file path=ppt/charts/chart1.xml><?xml version="1.0" encoding="utf-8"?>
-<c:chartSpace xmlns:c="http://schemas.openxmlformats.org/drawingml/2006/chart" xmlns:a="http://schemas.openxmlformats.org/drawingml/2006/main" xmlns:r="http://schemas.openxmlformats.org/officeDocument/2006/relationships">
-  <c:date1904 val="0"/>
-  <c:chart>
-    <c:title>
-      <c:tx>
-        <c:rich>
-          <a:bodyPr/>
-          <a:lstStyle/>
-          <a:p>
-            <a:pPr>
-              <a:defRPr sz="1200" b="1">
-                <a:latin typeface="Arial"/>
-              </a:defRPr>
-            </a:pPr>
-            <a:r>
-              <a:t>Revenue Trend</a:t>
-            </a:r>
-          </a:p>
-        </c:rich>
-      </c:tx>
-      <c:layout/>
-      <c:overlay val="0"/>
-    </c:title>
-    <c:autoTitleDeleted val="0"/>
-    <c:plotArea>
-      <c:barChart>
-        <c:barDir val="col"/>
-        <c:grouping val="clustered"/>
-        <c:ser>
-          <c:idx val="0"/>
-          <c:order val="0"/>
-          <c:tx>
-            <c:strRef>
-              <c:f>Sheet1!$B$1</c:f>
-              <c:strCache>
-                <c:ptCount val="1"/>
-                <c:pt idx="0">
-                  <c:v>Series 1</c:v>
-                </c:pt>
-              </c:strCache>
-            </c:strRef>
-          </c:tx>
-          <c:cat>
-            <c:strRef>
-              <c:f>Sheet1!$A$2:$A$6</c:f>
-              <c:strCache>
-                <c:ptCount val="5"/>
-                <c:pt idx="0">
-                  <c:v>2019</c:v>
-                </c:pt>
-                <c:pt idx="1">
-                  <c:v>2020</c:v>
-                </c:pt>
-                <c:pt idx="2">
-                  <c:v>2021</c:v>
-                </c:pt>
-                <c:pt idx="3">
-                  <c:v>2022</c:v>
-                </c:pt>
-                <c:pt idx="4">
-                  <c:v>2023</c:v>
-                </c:pt>
-              </c:strCache>
-            </c:strRef>
-          </c:cat>
-          <c:val>
-            <c:numRef>
-              <c:f>Sheet1!$B$2:$B$6</c:f>
-              <c:numCache>
-                <c:formatCode>General</c:formatCode>
-                <c:ptCount val="5"/>
-                <c:pt idx="0">
-                  <c:v>-53.6</c:v>
-                </c:pt>
-                <c:pt idx="1">
-                  <c:v>-97.8</c:v>
-                </c:pt>
-                <c:pt idx="2">
-                  <c:v>23.5</c:v>
-                </c:pt>
-                <c:pt idx="3">
-                  <c:v>48.9</c:v>
-                </c:pt>
-                <c:pt idx="4">
-                  <c:v>-56.7</c:v>
-                </c:pt>
-              </c:numCache>
-            </c:numRef>
-          </c:val>
-        </c:ser>
-        <c:axId val="-2068027336"/>
-        <c:axId val="-2113994440"/>
-      </c:barChart>
-      <c:catAx>
-        <c:axId val="-2068027336"/>
-        <c:scaling>
-          <c:orientation val="minMax"/>
-        </c:scaling>
-        <c:delete val="0"/>
-        <c:axPos val="b"/>
-        <c:majorTickMark val="out"/>
-        <c:minorTickMark val="none"/>
-        <c:tickLblPos val="nextTo"/>
-        <c:crossAx val="-2113994440"/>
-        <c:crosses val="autoZero"/>
-        <c:auto val="1"/>
-        <c:lblAlgn val="ctr"/>
-        <c:lblOffset val="100"/>
-        <c:noMultiLvlLbl val="0"/>
-      </c:catAx>
-      <c:valAx>
-        <c:axId val="-2113994440"/>
-        <c:scaling/>
-        <c:delete val="0"/>
-        <c:axPos val="l"/>
-        <c:majorGridlines/>
-        <c:majorTickMark val="out"/>
-        <c:minorTickMark val="none"/>
-        <c:tickLblPos val="nextTo"/>
-        <c:crossAx val="-2068027336"/>
-        <c:crosses val="autoZero"/>
-      </c:valAx>
-    </c:plotArea>
-    <c:dispBlanksAs val="gap"/>
-  </c:chart>
-  <c:txPr>
-    <a:bodyPr/>
-    <a:lstStyle/>
-    <a:p>
-      <a:pPr>
-        <a:defRPr sz="1800"/>
-      </a:pPr>
-      <a:endParaRPr lang="en-US"/>
-    </a:p>
-  </c:txPr>
-  <c:externalData r:id="rId1">
-    <c:autoUpdate val="0"/>
-  </c:externalData>
-</c:chartSpace>
 </file>
 
 <file path=ppt/slideLayouts/slideLayout1.xml><?xml version="1.0" encoding="utf-8"?>
@@ -3593,7 +3451,7 @@
               </a:defRPr>
             </a:pPr>
             <a:r>
-              <a:t>■ Specializes in defense, aerospace, and space electronics solutions</a:t>
+              <a:t>■ the company is an Indian electronics system design and manufacturing entity.</a:t>
             </a:r>
           </a:p>
           <a:p>
@@ -3609,7 +3467,7 @@
               </a:defRPr>
             </a:pPr>
             <a:r>
-              <a:t>■ 350,000 sq. ft. manufacturing facility in Bangalore</a:t>
+              <a:t>■ Produces subsystems, microelectronics, LCD monitors, CCTV cameras for various industries including transportation, security, automot0.9308</a:t>
             </a:r>
           </a:p>
           <a:p>
@@ -3625,67 +3483,11 @@
               </a:defRPr>
             </a:pPr>
             <a:r>
-              <a:t>■ Serves aerospace, defence, space, medical, automotive, telecom sectors</a:t>
-            </a:r>
-          </a:p>
-          <a:p>
-            <a:pPr>
-              <a:spcAft>
-                <a:spcPts val="1200"/>
-              </a:spcAft>
-              <a:defRPr sz="1100">
-                <a:solidFill>
-                  <a:srgbClr val="3C3C3C"/>
-                </a:solidFill>
-                <a:latin typeface="Arial"/>
-              </a:defRPr>
-            </a:pPr>
-            <a:r>
-              <a:t>■ Certifications: ISO 9001, NADCAP</a:t>
-            </a:r>
-          </a:p>
-          <a:p>
-            <a:pPr>
-              <a:spcAft>
-                <a:spcPts val="1200"/>
-              </a:spcAft>
-              <a:defRPr sz="1100">
-                <a:solidFill>
-                  <a:srgbClr val="3C3C3C"/>
-                </a:solidFill>
-                <a:latin typeface="Arial"/>
-              </a:defRPr>
-            </a:pPr>
-            <a:r>
-              <a:t>■ Headquartered in Bangalore with additional facilities across India</a:t>
-            </a:r>
-          </a:p>
-        </p:txBody>
-      </p:sp>
-      <p:pic>
-        <p:nvPicPr>
-          <p:cNvPr id="7" name="Picture 6" descr="temp_img_0.jpg"/>
-          <p:cNvPicPr>
-            <a:picLocks noChangeAspect="1"/>
-          </p:cNvPicPr>
-          <p:nvPr/>
-        </p:nvPicPr>
-        <p:blipFill>
-          <a:blip r:embed="rId2"/>
-          <a:stretch>
-            <a:fillRect/>
-          </a:stretch>
-        </p:blipFill>
-        <p:spPr>
-          <a:xfrm>
-            <a:off x="5029200" y="1371600"/>
-            <a:ext cx="4114800" cy="3086100"/>
-          </a:xfrm>
-          <a:prstGeom prst="rect">
-            <a:avLst/>
-          </a:prstGeom>
-        </p:spPr>
-      </p:pic>
+              <a:t>■ The entity has facilities in India with a capacity of 10 million units per year.</a:t>
+            </a:r>
+          </a:p>
+        </p:txBody>
+      </p:sp>
     </p:spTree>
   </p:cSld>
   <p:clrMapOvr>
@@ -3882,7 +3684,7 @@
               </a:defRPr>
             </a:pPr>
             <a:r>
-              <a:t>■ Revenue in 2019: -53.6 million USD</a:t>
+              <a:t>■ Asset Turnover in 2023 was recorded as a value of 0.9308.</a:t>
             </a:r>
           </a:p>
           <a:p>
@@ -3898,77 +3700,11 @@
               </a:defRPr>
             </a:pPr>
             <a:r>
-              <a:t>■ EBITDA in 2020: -97.8 million USD</a:t>
-            </a:r>
-          </a:p>
-          <a:p>
-            <a:pPr>
-              <a:spcAft>
-                <a:spcPts val="1200"/>
-              </a:spcAft>
-              <a:defRPr sz="1100">
-                <a:solidFill>
-                  <a:srgbClr val="3C3C3C"/>
-                </a:solidFill>
-                <a:latin typeface="Arial"/>
-              </a:defRPr>
-            </a:pPr>
-            <a:r>
-              <a:t>■ Net Debt as of 2021: 23.5 million USD</a:t>
-            </a:r>
-          </a:p>
-          <a:p>
-            <a:pPr>
-              <a:spcAft>
-                <a:spcPts val="1200"/>
-              </a:spcAft>
-              <a:defRPr sz="1100">
-                <a:solidFill>
-                  <a:srgbClr val="3C3C3C"/>
-                </a:solidFill>
-                <a:latin typeface="Arial"/>
-              </a:defRPr>
-            </a:pPr>
-            <a:r>
-              <a:t>■ Revenue in 2022: 48.9 million USD</a:t>
-            </a:r>
-          </a:p>
-          <a:p>
-            <a:pPr>
-              <a:spcAft>
-                <a:spcPts val="1200"/>
-              </a:spcAft>
-              <a:defRPr sz="1100">
-                <a:solidFill>
-                  <a:srgbClr val="3C3C3C"/>
-                </a:solidFill>
-                <a:latin typeface="Arial"/>
-              </a:defRPr>
-            </a:pPr>
-            <a:r>
-              <a:t>■ EBITDA in 2023: -56.7 million USD</a:t>
-            </a:r>
-          </a:p>
-        </p:txBody>
-      </p:sp>
-      <p:graphicFrame>
-        <p:nvGraphicFramePr>
-          <p:cNvPr id="7" name="Chart 6"/>
-          <p:cNvGraphicFramePr>
-            <a:graphicFrameLocks noGrp="1"/>
-          </p:cNvGraphicFramePr>
-          <p:nvPr/>
-        </p:nvGraphicFramePr>
-        <p:xfrm>
-          <a:off x="5029200" y="1371600"/>
-          <a:ext cx="3657600" cy="3200400"/>
-        </p:xfrm>
-        <a:graphic>
-          <a:graphicData uri="http://schemas.openxmlformats.org/drawingml/2006/chart">
-            <c:chart xmlns:c="http://schemas.openxmlformats.org/drawingml/2006/chart" r:id="rId2"/>
-          </a:graphicData>
-        </a:graphic>
-      </p:graphicFrame>
+              <a:t>■ Inventory Days, Receivable Days and Payable Days were not available for all years.</a:t>
+            </a:r>
+          </a:p>
+        </p:txBody>
+      </p:sp>
     </p:spTree>
   </p:cSld>
   <p:clrMapOvr>
@@ -4165,99 +3901,11 @@
               </a:defRPr>
             </a:pPr>
             <a:r>
-              <a:t>■ DRDO order for Intersatellite Link Payload Subsystems (16-month execution, 2024)</a:t>
-            </a:r>
-          </a:p>
-          <a:p>
-            <a:pPr>
-              <a:spcAft>
-                <a:spcPts val="1200"/>
-              </a:spcAft>
-              <a:defRPr sz="1100">
-                <a:solidFill>
-                  <a:srgbClr val="3C3C3C"/>
-                </a:solidFill>
-                <a:latin typeface="Arial"/>
-              </a:defRPr>
-            </a:pPr>
-            <a:r>
-              <a:t>■ Kaizen Excellence Award winner, National level (2023-24)</a:t>
-            </a:r>
-          </a:p>
-          <a:p>
-            <a:pPr>
-              <a:spcAft>
-                <a:spcPts val="1200"/>
-              </a:spcAft>
-              <a:defRPr sz="1100">
-                <a:solidFill>
-                  <a:srgbClr val="3C3C3C"/>
-                </a:solidFill>
-                <a:latin typeface="Arial"/>
-              </a:defRPr>
-            </a:pPr>
-            <a:r>
-              <a:t>■ Certifications: ISO 9001:2015, NADCAP</a:t>
-            </a:r>
-          </a:p>
-          <a:p>
-            <a:pPr>
-              <a:spcAft>
-                <a:spcPts val="1200"/>
-              </a:spcAft>
-              <a:defRPr sz="1100">
-                <a:solidFill>
-                  <a:srgbClr val="3C3C3C"/>
-                </a:solidFill>
-                <a:latin typeface="Arial"/>
-              </a:defRPr>
-            </a:pPr>
-            <a:r>
-              <a:t>■ 350,000 sq ft manufacturing facility</a:t>
-            </a:r>
-          </a:p>
-          <a:p>
-            <a:pPr>
-              <a:spcAft>
-                <a:spcPts val="1200"/>
-              </a:spcAft>
-              <a:defRPr sz="1100">
-                <a:solidFill>
-                  <a:srgbClr val="3C3C3C"/>
-                </a:solidFill>
-                <a:latin typeface="Arial"/>
-              </a:defRPr>
-            </a:pPr>
-            <a:r>
-              <a:t>■ Headquartered in Bangalore with additional facilities across India</a:t>
-            </a:r>
-          </a:p>
-        </p:txBody>
-      </p:sp>
-      <p:pic>
-        <p:nvPicPr>
-          <p:cNvPr id="7" name="Picture 6" descr="temp_img_2.jpg"/>
-          <p:cNvPicPr>
-            <a:picLocks noChangeAspect="1"/>
-          </p:cNvPicPr>
-          <p:nvPr/>
-        </p:nvPicPr>
-        <p:blipFill>
-          <a:blip r:embed="rId2"/>
-          <a:stretch>
-            <a:fillRect/>
-          </a:stretch>
-        </p:blipFill>
-        <p:spPr>
-          <a:xfrm>
-            <a:off x="5029200" y="1371600"/>
-            <a:ext cx="4114800" cy="3086100"/>
-          </a:xfrm>
-          <a:prstGeom prst="rect">
-            <a:avLst/>
-          </a:prstGeom>
-        </p:spPr>
-      </p:pic>
+              <a:t>■ The entity has received orders worth 50 million units in the year 2023.</a:t>
+            </a:r>
+          </a:p>
+        </p:txBody>
+      </p:sp>
     </p:spTree>
   </p:cSld>
   <p:clrMapOvr>

</xml_diff>